<commit_message>
Added Hands On Demos - Day 5
</commit_message>
<xml_diff>
--- a/4. Microservices with Spring Cloud/Day 5/Slides/1. Course Overview/course-overview-slides.pptx
+++ b/4. Microservices with Spring Cloud/Day 5/Slides/1. Course Overview/course-overview-slides.pptx
@@ -721,28 +721,6 @@
           <a:p/>
         </p:txBody>
       </p:sp>
-      <p:pic>
-        <p:nvPicPr>
-          <p:cNvPr id="17" name="bg object 17"/>
-          <p:cNvPicPr/>
-          <p:nvPr/>
-        </p:nvPicPr>
-        <p:blipFill>
-          <a:blip r:embed="rId2" cstate="print"/>
-          <a:stretch>
-            <a:fillRect/>
-          </a:stretch>
-        </p:blipFill>
-        <p:spPr>
-          <a:xfrm>
-            <a:off x="11495531" y="6184391"/>
-            <a:ext cx="451103" cy="449579"/>
-          </a:xfrm>
-          <a:prstGeom prst="rect">
-            <a:avLst/>
-          </a:prstGeom>
-        </p:spPr>
-      </p:pic>
       <p:sp>
         <p:nvSpPr>
           <p:cNvPr id="2" name="Holder 2"/>
@@ -1397,28 +1375,6 @@
           <a:chExt cx="0" cy="0"/>
         </a:xfrm>
       </p:grpSpPr>
-      <p:pic>
-        <p:nvPicPr>
-          <p:cNvPr id="16" name="bg object 16"/>
-          <p:cNvPicPr/>
-          <p:nvPr/>
-        </p:nvPicPr>
-        <p:blipFill>
-          <a:blip r:embed="rId6" cstate="print"/>
-          <a:stretch>
-            <a:fillRect/>
-          </a:stretch>
-        </p:blipFill>
-        <p:spPr>
-          <a:xfrm>
-            <a:off x="11495531" y="6184391"/>
-            <a:ext cx="451103" cy="449579"/>
-          </a:xfrm>
-          <a:prstGeom prst="rect">
-            <a:avLst/>
-          </a:prstGeom>
-        </p:spPr>
-      </p:pic>
       <p:sp>
         <p:nvSpPr>
           <p:cNvPr id="2" name="Holder 2"/>
@@ -1913,34 +1869,12 @@
       </p:grpSpPr>
       <p:pic>
         <p:nvPicPr>
-          <p:cNvPr id="2" name="object 2"/>
+          <p:cNvPr id="3" name="object 3"/>
           <p:cNvPicPr/>
           <p:nvPr/>
         </p:nvPicPr>
         <p:blipFill>
           <a:blip r:embed="rId1" cstate="print"/>
-          <a:stretch>
-            <a:fillRect/>
-          </a:stretch>
-        </p:blipFill>
-        <p:spPr>
-          <a:xfrm>
-            <a:off x="11495531" y="6184391"/>
-            <a:ext cx="451103" cy="449579"/>
-          </a:xfrm>
-          <a:prstGeom prst="rect">
-            <a:avLst/>
-          </a:prstGeom>
-        </p:spPr>
-      </p:pic>
-      <p:pic>
-        <p:nvPicPr>
-          <p:cNvPr id="3" name="object 3"/>
-          <p:cNvPicPr/>
-          <p:nvPr/>
-        </p:nvPicPr>
-        <p:blipFill>
-          <a:blip r:embed="rId2" cstate="print"/>
           <a:stretch>
             <a:fillRect/>
           </a:stretch>
@@ -2328,7 +2262,7 @@
         </p:nvPicPr>
         <p:blipFill>
           <a:blip r:embed="rId1"/>
-          <a:srcRect/>
+          <a:srcRect b="4435"/>
           <a:stretch>
             <a:fillRect/>
           </a:stretch>
@@ -2336,7 +2270,7 @@
         <p:spPr bwMode="auto">
           <a:xfrm>
             <a:off x="0" y="0"/>
-            <a:ext cx="12192000" cy="6857999"/>
+            <a:ext cx="12192000" cy="6858000"/>
           </a:xfrm>
           <a:prstGeom prst="rect">
             <a:avLst/>
@@ -2407,7 +2341,7 @@
       </p:grpSpPr>
       <p:sp>
         <p:nvSpPr>
-          <p:cNvPr id="7" name="Title 6"/>
+          <p:cNvPr id="10" name="Title 9"/>
           <p:cNvSpPr>
             <a:spLocks noGrp="1"/>
           </p:cNvSpPr>
@@ -2447,7 +2381,7 @@
       </p:sp>
       <p:sp>
         <p:nvSpPr>
-          <p:cNvPr id="8" name="Content Placeholder 7"/>
+          <p:cNvPr id="11" name="Content Placeholder 10"/>
           <p:cNvSpPr>
             <a:spLocks noGrp="1"/>
           </p:cNvSpPr>
@@ -2465,30 +2399,30 @@
       </p:sp>
       <p:graphicFrame>
         <p:nvGraphicFramePr>
-          <p:cNvPr id="4" name="Content Placeholder 3"/>
+          <p:cNvPr id="3" name="Content Placeholder 2"/>
           <p:cNvGraphicFramePr/>
           <p:nvPr>
             <p:ph sz="half" idx="2"/>
           </p:nvPr>
         </p:nvGraphicFramePr>
         <p:xfrm>
-          <a:off x="685800" y="812800"/>
-          <a:ext cx="10149205" cy="5442585"/>
+          <a:off x="304800" y="381000"/>
+          <a:ext cx="11612245" cy="6038215"/>
         </p:xfrm>
         <a:graphic>
           <a:graphicData uri="http://schemas.openxmlformats.org/presentationml/2006/ole">
             <mc:AlternateContent xmlns:mc="http://schemas.openxmlformats.org/markup-compatibility/2006">
               <mc:Choice xmlns:v="urn:schemas-microsoft-com:vml" Requires="v">
-                <p:oleObj spid="_x0000_s5" name="" r:id="rId1" imgW="11400790" imgH="6877050" progId="Paint.Picture">
+                <p:oleObj spid="_x0000_s9" name="" r:id="rId1" imgW="11001375" imgH="5619750" progId="Paint.Picture">
                   <p:embed/>
                 </p:oleObj>
               </mc:Choice>
               <mc:Fallback>
-                <p:oleObj name="" r:id="rId1" imgW="11400790" imgH="6877050" progId="Paint.Picture">
+                <p:oleObj name="" r:id="rId1" imgW="11001375" imgH="5619750" progId="Paint.Picture">
                   <p:embed/>
                   <p:pic>
                     <p:nvPicPr>
-                      <p:cNvPr id="0" name="Picture 4"/>
+                      <p:cNvPr id="0" name="Picture 8"/>
                       <p:cNvPicPr/>
                       <p:nvPr/>
                     </p:nvPicPr>
@@ -2500,8 +2434,8 @@
                     </p:blipFill>
                     <p:spPr>
                       <a:xfrm>
-                        <a:off x="685800" y="812800"/>
-                        <a:ext cx="10149205" cy="5442585"/>
+                        <a:off x="304800" y="381000"/>
+                        <a:ext cx="11612245" cy="6038215"/>
                       </a:xfrm>
                       <a:prstGeom prst="rect">
                         <a:avLst/>
@@ -2594,15 +2528,15 @@
         </p:nvPicPr>
         <p:blipFill>
           <a:blip r:embed="rId1"/>
-          <a:srcRect/>
+          <a:srcRect b="4244"/>
           <a:stretch>
             <a:fillRect/>
           </a:stretch>
         </p:blipFill>
         <p:spPr bwMode="auto">
           <a:xfrm>
-            <a:off x="0" y="41020"/>
-            <a:ext cx="12190142" cy="6816980"/>
+            <a:off x="0" y="15240"/>
+            <a:ext cx="12190095" cy="6932295"/>
           </a:xfrm>
           <a:prstGeom prst="rect">
             <a:avLst/>
@@ -2719,7 +2653,7 @@
         </p:nvPicPr>
         <p:blipFill>
           <a:blip r:embed="rId1"/>
-          <a:srcRect/>
+          <a:srcRect b="4009"/>
           <a:stretch>
             <a:fillRect/>
           </a:stretch>
@@ -2791,7 +2725,7 @@
       </p:grpSpPr>
       <p:sp>
         <p:nvSpPr>
-          <p:cNvPr id="2" name="Title 1"/>
+          <p:cNvPr id="7" name="Title 6"/>
           <p:cNvSpPr>
             <a:spLocks noGrp="1"/>
           </p:cNvSpPr>
@@ -2802,64 +2736,11 @@
         <p:spPr/>
         <p:txBody>
           <a:bodyPr/>
-          <a:lstStyle/>
           <a:p>
             <a:endParaRPr lang="en-US"/>
           </a:p>
         </p:txBody>
       </p:sp>
-      <p:sp>
-        <p:nvSpPr>
-          <p:cNvPr id="3" name="Text Placeholder 2"/>
-          <p:cNvSpPr>
-            <a:spLocks noGrp="1"/>
-          </p:cNvSpPr>
-          <p:nvPr>
-            <p:ph type="body" idx="1"/>
-          </p:nvPr>
-        </p:nvSpPr>
-        <p:spPr/>
-        <p:txBody>
-          <a:bodyPr/>
-          <a:lstStyle/>
-          <a:p>
-            <a:endParaRPr lang="en-US"/>
-          </a:p>
-        </p:txBody>
-      </p:sp>
-      <p:pic>
-        <p:nvPicPr>
-          <p:cNvPr id="6146" name="Picture 2"/>
-          <p:cNvPicPr>
-            <a:picLocks noChangeAspect="1" noChangeArrowheads="1"/>
-          </p:cNvPicPr>
-          <p:nvPr/>
-        </p:nvPicPr>
-        <p:blipFill>
-          <a:blip r:embed="rId1"/>
-          <a:srcRect/>
-          <a:stretch>
-            <a:fillRect/>
-          </a:stretch>
-        </p:blipFill>
-        <p:spPr bwMode="auto">
-          <a:xfrm>
-            <a:off x="0" y="-798"/>
-            <a:ext cx="12192000" cy="6858797"/>
-          </a:xfrm>
-          <a:prstGeom prst="rect">
-            <a:avLst/>
-          </a:prstGeom>
-          <a:noFill/>
-          <a:ln w="9525">
-            <a:noFill/>
-            <a:miter lim="800000"/>
-            <a:headEnd/>
-            <a:tailEnd/>
-          </a:ln>
-          <a:effectLst/>
-        </p:spPr>
-      </p:pic>
       <p:sp>
         <p:nvSpPr>
           <p:cNvPr id="5" name="Slide Number Placeholder 4"/>
@@ -2882,6 +2763,76 @@
           </a:p>
         </p:txBody>
       </p:sp>
+      <p:sp>
+        <p:nvSpPr>
+          <p:cNvPr id="8" name="Content Placeholder 7"/>
+          <p:cNvSpPr>
+            <a:spLocks noGrp="1"/>
+          </p:cNvSpPr>
+          <p:nvPr>
+            <p:ph sz="half" idx="3"/>
+          </p:nvPr>
+        </p:nvSpPr>
+        <p:spPr/>
+        <p:txBody>
+          <a:bodyPr/>
+          <a:p>
+            <a:endParaRPr lang="en-US"/>
+          </a:p>
+        </p:txBody>
+      </p:sp>
+      <p:graphicFrame>
+        <p:nvGraphicFramePr>
+          <p:cNvPr id="4" name="Content Placeholder 3"/>
+          <p:cNvGraphicFramePr/>
+          <p:nvPr>
+            <p:ph sz="half" idx="2"/>
+          </p:nvPr>
+        </p:nvGraphicFramePr>
+        <p:xfrm>
+          <a:off x="914400" y="236220"/>
+          <a:ext cx="10787380" cy="6141720"/>
+        </p:xfrm>
+        <a:graphic>
+          <a:graphicData uri="http://schemas.openxmlformats.org/presentationml/2006/ole">
+            <mc:AlternateContent xmlns:mc="http://schemas.openxmlformats.org/markup-compatibility/2006">
+              <mc:Choice xmlns:v="urn:schemas-microsoft-com:vml" Requires="v">
+                <p:oleObj spid="_x0000_s6" name="" r:id="rId1" imgW="11400790" imgH="6867525" progId="Paint.Picture">
+                  <p:embed/>
+                </p:oleObj>
+              </mc:Choice>
+              <mc:Fallback>
+                <p:oleObj name="" r:id="rId1" imgW="11400790" imgH="6867525" progId="Paint.Picture">
+                  <p:embed/>
+                  <p:pic>
+                    <p:nvPicPr>
+                      <p:cNvPr id="0" name="Picture 5"/>
+                      <p:cNvPicPr/>
+                      <p:nvPr/>
+                    </p:nvPicPr>
+                    <p:blipFill>
+                      <a:blip r:embed="rId2"/>
+                      <a:srcRect b="5534"/>
+                      <a:stretch>
+                        <a:fillRect/>
+                      </a:stretch>
+                    </p:blipFill>
+                    <p:spPr>
+                      <a:xfrm>
+                        <a:off x="914400" y="236220"/>
+                        <a:ext cx="10787380" cy="6141720"/>
+                      </a:xfrm>
+                      <a:prstGeom prst="rect">
+                        <a:avLst/>
+                      </a:prstGeom>
+                    </p:spPr>
+                  </p:pic>
+                </p:oleObj>
+              </mc:Fallback>
+            </mc:AlternateContent>
+          </a:graphicData>
+        </a:graphic>
+      </p:graphicFrame>
     </p:spTree>
   </p:cSld>
   <p:clrMapOvr>

</xml_diff>